<commit_message>
update report  add interview summry #117
</commit_message>
<xml_diff>
--- a/report1/system-architecture-figure.pptx
+++ b/report1/system-architecture-figure.pptx
@@ -105,6 +105,11 @@
       </a:defRPr>
     </a:lvl9pPr>
   </p:defaultTextStyle>
+  <p:extLst>
+    <p:ext uri="{EFAFB233-063F-42B5-8137-9DF3F51BA10A}">
+      <p15:sldGuideLst xmlns:p15="http://schemas.microsoft.com/office/powerpoint/2012/main"/>
+    </p:ext>
+  </p:extLst>
 </p:presentation>
 </file>
 
@@ -239,7 +244,7 @@
           <a:p>
             <a:fld id="{491A2387-CC1D-4F2C-BF10-4CD86FB6A68D}" type="datetimeFigureOut">
               <a:rPr kumimoji="1" lang="ja-JP" altLang="en-US" smtClean="0"/>
-              <a:t>2016/11/2</a:t>
+              <a:t>2016/11/4</a:t>
             </a:fld>
             <a:endParaRPr kumimoji="1" lang="ja-JP" altLang="en-US"/>
           </a:p>
@@ -441,7 +446,7 @@
           <a:p>
             <a:fld id="{491A2387-CC1D-4F2C-BF10-4CD86FB6A68D}" type="datetimeFigureOut">
               <a:rPr kumimoji="1" lang="ja-JP" altLang="en-US" smtClean="0"/>
-              <a:t>2016/11/2</a:t>
+              <a:t>2016/11/4</a:t>
             </a:fld>
             <a:endParaRPr kumimoji="1" lang="ja-JP" altLang="en-US"/>
           </a:p>
@@ -653,7 +658,7 @@
           <a:p>
             <a:fld id="{491A2387-CC1D-4F2C-BF10-4CD86FB6A68D}" type="datetimeFigureOut">
               <a:rPr kumimoji="1" lang="ja-JP" altLang="en-US" smtClean="0"/>
-              <a:t>2016/11/2</a:t>
+              <a:t>2016/11/4</a:t>
             </a:fld>
             <a:endParaRPr kumimoji="1" lang="ja-JP" altLang="en-US"/>
           </a:p>
@@ -855,7 +860,7 @@
           <a:p>
             <a:fld id="{491A2387-CC1D-4F2C-BF10-4CD86FB6A68D}" type="datetimeFigureOut">
               <a:rPr kumimoji="1" lang="ja-JP" altLang="en-US" smtClean="0"/>
-              <a:t>2016/11/2</a:t>
+              <a:t>2016/11/4</a:t>
             </a:fld>
             <a:endParaRPr kumimoji="1" lang="ja-JP" altLang="en-US"/>
           </a:p>
@@ -1101,7 +1106,7 @@
           <a:p>
             <a:fld id="{491A2387-CC1D-4F2C-BF10-4CD86FB6A68D}" type="datetimeFigureOut">
               <a:rPr kumimoji="1" lang="ja-JP" altLang="en-US" smtClean="0"/>
-              <a:t>2016/11/2</a:t>
+              <a:t>2016/11/4</a:t>
             </a:fld>
             <a:endParaRPr kumimoji="1" lang="ja-JP" altLang="en-US"/>
           </a:p>
@@ -1397,7 +1402,7 @@
           <a:p>
             <a:fld id="{491A2387-CC1D-4F2C-BF10-4CD86FB6A68D}" type="datetimeFigureOut">
               <a:rPr kumimoji="1" lang="ja-JP" altLang="en-US" smtClean="0"/>
-              <a:t>2016/11/2</a:t>
+              <a:t>2016/11/4</a:t>
             </a:fld>
             <a:endParaRPr kumimoji="1" lang="ja-JP" altLang="en-US"/>
           </a:p>
@@ -1828,7 +1833,7 @@
           <a:p>
             <a:fld id="{491A2387-CC1D-4F2C-BF10-4CD86FB6A68D}" type="datetimeFigureOut">
               <a:rPr kumimoji="1" lang="ja-JP" altLang="en-US" smtClean="0"/>
-              <a:t>2016/11/2</a:t>
+              <a:t>2016/11/4</a:t>
             </a:fld>
             <a:endParaRPr kumimoji="1" lang="ja-JP" altLang="en-US"/>
           </a:p>
@@ -1946,7 +1951,7 @@
           <a:p>
             <a:fld id="{491A2387-CC1D-4F2C-BF10-4CD86FB6A68D}" type="datetimeFigureOut">
               <a:rPr kumimoji="1" lang="ja-JP" altLang="en-US" smtClean="0"/>
-              <a:t>2016/11/2</a:t>
+              <a:t>2016/11/4</a:t>
             </a:fld>
             <a:endParaRPr kumimoji="1" lang="ja-JP" altLang="en-US"/>
           </a:p>
@@ -2041,7 +2046,7 @@
           <a:p>
             <a:fld id="{491A2387-CC1D-4F2C-BF10-4CD86FB6A68D}" type="datetimeFigureOut">
               <a:rPr kumimoji="1" lang="ja-JP" altLang="en-US" smtClean="0"/>
-              <a:t>2016/11/2</a:t>
+              <a:t>2016/11/4</a:t>
             </a:fld>
             <a:endParaRPr kumimoji="1" lang="ja-JP" altLang="en-US"/>
           </a:p>
@@ -2350,7 +2355,7 @@
           <a:p>
             <a:fld id="{491A2387-CC1D-4F2C-BF10-4CD86FB6A68D}" type="datetimeFigureOut">
               <a:rPr kumimoji="1" lang="ja-JP" altLang="en-US" smtClean="0"/>
-              <a:t>2016/11/2</a:t>
+              <a:t>2016/11/4</a:t>
             </a:fld>
             <a:endParaRPr kumimoji="1" lang="ja-JP" altLang="en-US"/>
           </a:p>
@@ -2603,7 +2608,7 @@
           <a:p>
             <a:fld id="{491A2387-CC1D-4F2C-BF10-4CD86FB6A68D}" type="datetimeFigureOut">
               <a:rPr kumimoji="1" lang="ja-JP" altLang="en-US" smtClean="0"/>
-              <a:t>2016/11/2</a:t>
+              <a:t>2016/11/4</a:t>
             </a:fld>
             <a:endParaRPr kumimoji="1" lang="ja-JP" altLang="en-US"/>
           </a:p>
@@ -2848,7 +2853,7 @@
           <a:p>
             <a:fld id="{491A2387-CC1D-4F2C-BF10-4CD86FB6A68D}" type="datetimeFigureOut">
               <a:rPr kumimoji="1" lang="ja-JP" altLang="en-US" smtClean="0"/>
-              <a:t>2016/11/2</a:t>
+              <a:t>2016/11/4</a:t>
             </a:fld>
             <a:endParaRPr kumimoji="1" lang="ja-JP" altLang="en-US"/>
           </a:p>
@@ -3253,401 +3258,68 @@
           <a:chExt cx="0" cy="0"/>
         </a:xfrm>
       </p:grpSpPr>
-      <p:sp>
-        <p:nvSpPr>
-          <p:cNvPr id="18" name="角丸四角形 17"/>
-          <p:cNvSpPr/>
-          <p:nvPr/>
-        </p:nvSpPr>
-        <p:spPr>
-          <a:xfrm>
-            <a:off x="2309501" y="2313069"/>
-            <a:ext cx="6540153" cy="4412974"/>
-          </a:xfrm>
-          <a:prstGeom prst="roundRect">
-            <a:avLst/>
-          </a:prstGeom>
-        </p:spPr>
-        <p:style>
-          <a:lnRef idx="2">
-            <a:schemeClr val="accent1"/>
-          </a:lnRef>
-          <a:fillRef idx="1">
-            <a:schemeClr val="lt1"/>
-          </a:fillRef>
-          <a:effectRef idx="0">
-            <a:schemeClr val="accent1"/>
-          </a:effectRef>
-          <a:fontRef idx="minor">
-            <a:schemeClr val="dk1"/>
-          </a:fontRef>
-        </p:style>
-        <p:txBody>
-          <a:bodyPr rtlCol="0" anchor="ctr"/>
-          <a:lstStyle/>
-          <a:p>
-            <a:pPr algn="ctr"/>
-            <a:endParaRPr kumimoji="1" lang="ja-JP" altLang="en-US" dirty="0"/>
-          </a:p>
-        </p:txBody>
-      </p:sp>
-      <p:pic>
-        <p:nvPicPr>
-          <p:cNvPr id="4" name="図 3"/>
-          <p:cNvPicPr>
-            <a:picLocks noChangeAspect="1"/>
-          </p:cNvPicPr>
-          <p:nvPr/>
-        </p:nvPicPr>
-        <p:blipFill>
-          <a:blip r:embed="rId2">
-            <a:extLst>
-              <a:ext uri="{28A0092B-C50C-407E-A947-70E740481C1C}">
-                <a14:useLocalDpi xmlns:a14="http://schemas.microsoft.com/office/drawing/2010/main" val="0"/>
-              </a:ext>
-            </a:extLst>
-          </a:blip>
-          <a:stretch>
-            <a:fillRect/>
-          </a:stretch>
-        </p:blipFill>
-        <p:spPr>
-          <a:xfrm>
-            <a:off x="255311" y="778205"/>
-            <a:ext cx="2038117" cy="1159736"/>
-          </a:xfrm>
-          <a:prstGeom prst="rect">
-            <a:avLst/>
-          </a:prstGeom>
-        </p:spPr>
-      </p:pic>
-      <p:pic>
-        <p:nvPicPr>
-          <p:cNvPr id="13" name="図 12"/>
-          <p:cNvPicPr>
-            <a:picLocks noChangeAspect="1"/>
-          </p:cNvPicPr>
-          <p:nvPr/>
-        </p:nvPicPr>
-        <p:blipFill>
-          <a:blip r:embed="rId3">
-            <a:extLst>
-              <a:ext uri="{BEBA8EAE-BF5A-486C-A8C5-ECC9F3942E4B}">
-                <a14:imgProps xmlns:a14="http://schemas.microsoft.com/office/drawing/2010/main">
-                  <a14:imgLayer r:embed="rId4">
-                    <a14:imgEffect>
-                      <a14:backgroundRemoval t="0" b="100000" l="0" r="99427"/>
-                    </a14:imgEffect>
-                  </a14:imgLayer>
-                </a14:imgProps>
-              </a:ext>
-              <a:ext uri="{28A0092B-C50C-407E-A947-70E740481C1C}">
-                <a14:useLocalDpi xmlns:a14="http://schemas.microsoft.com/office/drawing/2010/main" val="0"/>
-              </a:ext>
-            </a:extLst>
-          </a:blip>
-          <a:stretch>
-            <a:fillRect/>
-          </a:stretch>
-        </p:blipFill>
-        <p:spPr>
-          <a:xfrm>
-            <a:off x="9761261" y="520843"/>
-            <a:ext cx="1655487" cy="1674461"/>
-          </a:xfrm>
-          <a:prstGeom prst="rect">
-            <a:avLst/>
-          </a:prstGeom>
-        </p:spPr>
-      </p:pic>
-      <p:pic>
-        <p:nvPicPr>
-          <p:cNvPr id="15" name="図 14"/>
-          <p:cNvPicPr>
-            <a:picLocks noChangeAspect="1"/>
-          </p:cNvPicPr>
-          <p:nvPr/>
-        </p:nvPicPr>
-        <p:blipFill>
-          <a:blip r:embed="rId5" cstate="print">
-            <a:extLst>
-              <a:ext uri="{28A0092B-C50C-407E-A947-70E740481C1C}">
-                <a14:useLocalDpi xmlns:a14="http://schemas.microsoft.com/office/drawing/2010/main" val="0"/>
-              </a:ext>
-            </a:extLst>
-          </a:blip>
-          <a:stretch>
-            <a:fillRect/>
-          </a:stretch>
-        </p:blipFill>
-        <p:spPr>
-          <a:xfrm>
-            <a:off x="6298718" y="2892734"/>
-            <a:ext cx="1761090" cy="1144261"/>
-          </a:xfrm>
-          <a:prstGeom prst="rect">
-            <a:avLst/>
-          </a:prstGeom>
-        </p:spPr>
-      </p:pic>
-      <p:pic>
-        <p:nvPicPr>
-          <p:cNvPr id="16" name="図 15"/>
-          <p:cNvPicPr>
-            <a:picLocks noChangeAspect="1"/>
-          </p:cNvPicPr>
-          <p:nvPr/>
-        </p:nvPicPr>
-        <p:blipFill>
-          <a:blip r:embed="rId6">
-            <a:extLst>
-              <a:ext uri="{BEBA8EAE-BF5A-486C-A8C5-ECC9F3942E4B}">
-                <a14:imgProps xmlns:a14="http://schemas.microsoft.com/office/drawing/2010/main">
-                  <a14:imgLayer r:embed="rId7">
-                    <a14:imgEffect>
-                      <a14:backgroundRemoval t="6667" b="94000" l="3000" r="96000"/>
-                    </a14:imgEffect>
-                  </a14:imgLayer>
-                </a14:imgProps>
-              </a:ext>
-              <a:ext uri="{28A0092B-C50C-407E-A947-70E740481C1C}">
-                <a14:useLocalDpi xmlns:a14="http://schemas.microsoft.com/office/drawing/2010/main" val="0"/>
-              </a:ext>
-            </a:extLst>
-          </a:blip>
-          <a:stretch>
-            <a:fillRect/>
-          </a:stretch>
-        </p:blipFill>
-        <p:spPr>
-          <a:xfrm>
-            <a:off x="5848873" y="5109670"/>
-            <a:ext cx="1276140" cy="1276140"/>
-          </a:xfrm>
-          <a:prstGeom prst="rect">
-            <a:avLst/>
-          </a:prstGeom>
-        </p:spPr>
-      </p:pic>
-      <p:cxnSp>
-        <p:nvCxnSpPr>
-          <p:cNvPr id="20" name="直線矢印コネクタ 19"/>
-          <p:cNvCxnSpPr/>
-          <p:nvPr/>
-        </p:nvCxnSpPr>
-        <p:spPr>
-          <a:xfrm>
-            <a:off x="5040490" y="5215062"/>
-            <a:ext cx="808383" cy="289909"/>
-          </a:xfrm>
-          <a:prstGeom prst="straightConnector1">
-            <a:avLst/>
-          </a:prstGeom>
-          <a:ln>
-            <a:headEnd type="triangle"/>
-            <a:tailEnd type="triangle"/>
-          </a:ln>
-        </p:spPr>
-        <p:style>
-          <a:lnRef idx="1">
-            <a:schemeClr val="accent1"/>
-          </a:lnRef>
-          <a:fillRef idx="0">
-            <a:schemeClr val="accent1"/>
-          </a:fillRef>
-          <a:effectRef idx="0">
-            <a:schemeClr val="accent1"/>
-          </a:effectRef>
-          <a:fontRef idx="minor">
-            <a:schemeClr val="tx1"/>
-          </a:fontRef>
-        </p:style>
-      </p:cxnSp>
-      <p:cxnSp>
-        <p:nvCxnSpPr>
-          <p:cNvPr id="26" name="直線矢印コネクタ 25"/>
-          <p:cNvCxnSpPr/>
-          <p:nvPr/>
-        </p:nvCxnSpPr>
-        <p:spPr>
-          <a:xfrm flipH="1">
-            <a:off x="8157748" y="2019438"/>
-            <a:ext cx="1603513" cy="979479"/>
-          </a:xfrm>
-          <a:prstGeom prst="straightConnector1">
-            <a:avLst/>
-          </a:prstGeom>
-          <a:ln>
-            <a:tailEnd type="triangle"/>
-          </a:ln>
-        </p:spPr>
-        <p:style>
-          <a:lnRef idx="1">
-            <a:schemeClr val="accent1"/>
-          </a:lnRef>
-          <a:fillRef idx="0">
-            <a:schemeClr val="accent1"/>
-          </a:fillRef>
-          <a:effectRef idx="0">
-            <a:schemeClr val="accent1"/>
-          </a:effectRef>
-          <a:fontRef idx="minor">
-            <a:schemeClr val="tx1"/>
-          </a:fontRef>
-        </p:style>
-      </p:cxnSp>
-      <p:sp>
-        <p:nvSpPr>
-          <p:cNvPr id="34" name="テキスト ボックス 33"/>
-          <p:cNvSpPr txBox="1"/>
-          <p:nvPr/>
-        </p:nvSpPr>
-        <p:spPr>
-          <a:xfrm>
-            <a:off x="5060707" y="1919486"/>
-            <a:ext cx="1449436" cy="369332"/>
-          </a:xfrm>
-          <a:prstGeom prst="rect">
-            <a:avLst/>
-          </a:prstGeom>
-          <a:noFill/>
-        </p:spPr>
-        <p:txBody>
-          <a:bodyPr wrap="none" rtlCol="0">
-            <a:spAutoFit/>
-          </a:bodyPr>
-          <a:lstStyle/>
-          <a:p>
-            <a:r>
-              <a:rPr kumimoji="1" lang="en-US" altLang="ja-JP" dirty="0" smtClean="0"/>
-              <a:t>Linux Cents</a:t>
-            </a:r>
-            <a:endParaRPr kumimoji="1" lang="ja-JP" altLang="en-US" dirty="0"/>
-          </a:p>
-        </p:txBody>
-      </p:sp>
-      <p:sp>
-        <p:nvSpPr>
-          <p:cNvPr id="41" name="角丸四角形 40"/>
-          <p:cNvSpPr/>
-          <p:nvPr/>
-        </p:nvSpPr>
-        <p:spPr>
-          <a:xfrm>
-            <a:off x="2611464" y="2795446"/>
-            <a:ext cx="2186404" cy="3051283"/>
-          </a:xfrm>
-          <a:prstGeom prst="roundRect">
-            <a:avLst/>
-          </a:prstGeom>
-        </p:spPr>
-        <p:style>
-          <a:lnRef idx="2">
-            <a:schemeClr val="accent2"/>
-          </a:lnRef>
-          <a:fillRef idx="1">
-            <a:schemeClr val="lt1"/>
-          </a:fillRef>
-          <a:effectRef idx="0">
-            <a:schemeClr val="accent2"/>
-          </a:effectRef>
-          <a:fontRef idx="minor">
-            <a:schemeClr val="dk1"/>
-          </a:fontRef>
-        </p:style>
-        <p:txBody>
-          <a:bodyPr rtlCol="0" anchor="ctr"/>
-          <a:lstStyle/>
-          <a:p>
-            <a:pPr algn="ctr"/>
-            <a:endParaRPr kumimoji="1" lang="ja-JP" altLang="en-US"/>
-          </a:p>
-        </p:txBody>
-      </p:sp>
-      <p:sp>
-        <p:nvSpPr>
-          <p:cNvPr id="39" name="テキスト ボックス 38"/>
-          <p:cNvSpPr txBox="1"/>
-          <p:nvPr/>
-        </p:nvSpPr>
-        <p:spPr>
-          <a:xfrm>
-            <a:off x="636104" y="457200"/>
-            <a:ext cx="1063112" cy="369332"/>
-          </a:xfrm>
-          <a:prstGeom prst="rect">
-            <a:avLst/>
-          </a:prstGeom>
-          <a:noFill/>
-        </p:spPr>
-        <p:txBody>
-          <a:bodyPr wrap="none" rtlCol="0">
-            <a:spAutoFit/>
-          </a:bodyPr>
-          <a:lstStyle/>
-          <a:p>
-            <a:r>
-              <a:rPr lang="en-US" altLang="ja-JP" dirty="0" smtClean="0"/>
-              <a:t>Browser</a:t>
-            </a:r>
-            <a:endParaRPr kumimoji="1" lang="ja-JP" altLang="en-US" dirty="0"/>
-          </a:p>
-        </p:txBody>
-      </p:sp>
-      <p:sp>
-        <p:nvSpPr>
-          <p:cNvPr id="40" name="テキスト ボックス 39"/>
-          <p:cNvSpPr txBox="1"/>
-          <p:nvPr/>
-        </p:nvSpPr>
-        <p:spPr>
-          <a:xfrm>
-            <a:off x="9089540" y="2509177"/>
-            <a:ext cx="1394934" cy="369332"/>
-          </a:xfrm>
-          <a:prstGeom prst="rect">
-            <a:avLst/>
-          </a:prstGeom>
-          <a:noFill/>
-        </p:spPr>
-        <p:txBody>
-          <a:bodyPr wrap="none" rtlCol="0">
-            <a:spAutoFit/>
-          </a:bodyPr>
-          <a:lstStyle/>
-          <a:p>
-            <a:r>
-              <a:rPr lang="en-US" altLang="ja-JP" dirty="0" smtClean="0"/>
-              <a:t>Page Crawl</a:t>
-            </a:r>
-            <a:endParaRPr kumimoji="1" lang="ja-JP" altLang="en-US" dirty="0"/>
-          </a:p>
-        </p:txBody>
-      </p:sp>
       <p:grpSp>
         <p:nvGrpSpPr>
-          <p:cNvPr id="42" name="グループ化 41"/>
+          <p:cNvPr id="2" name="グループ化 1"/>
           <p:cNvGrpSpPr/>
           <p:nvPr/>
         </p:nvGrpSpPr>
         <p:grpSpPr>
           <a:xfrm>
-            <a:off x="2849386" y="3146206"/>
-            <a:ext cx="1705368" cy="2601534"/>
-            <a:chOff x="2849386" y="3146206"/>
-            <a:chExt cx="1705368" cy="2601534"/>
+            <a:off x="255311" y="457200"/>
+            <a:ext cx="11161437" cy="6268843"/>
+            <a:chOff x="255311" y="457200"/>
+            <a:chExt cx="11161437" cy="6268843"/>
           </a:xfrm>
         </p:grpSpPr>
+        <p:sp>
+          <p:nvSpPr>
+            <p:cNvPr id="18" name="角丸四角形 17"/>
+            <p:cNvSpPr/>
+            <p:nvPr/>
+          </p:nvSpPr>
+          <p:spPr>
+            <a:xfrm>
+              <a:off x="2309501" y="2313069"/>
+              <a:ext cx="6540153" cy="4412974"/>
+            </a:xfrm>
+            <a:prstGeom prst="roundRect">
+              <a:avLst/>
+            </a:prstGeom>
+          </p:spPr>
+          <p:style>
+            <a:lnRef idx="2">
+              <a:schemeClr val="accent1"/>
+            </a:lnRef>
+            <a:fillRef idx="1">
+              <a:schemeClr val="lt1"/>
+            </a:fillRef>
+            <a:effectRef idx="0">
+              <a:schemeClr val="accent1"/>
+            </a:effectRef>
+            <a:fontRef idx="minor">
+              <a:schemeClr val="dk1"/>
+            </a:fontRef>
+          </p:style>
+          <p:txBody>
+            <a:bodyPr rtlCol="0" anchor="ctr"/>
+            <a:lstStyle/>
+            <a:p>
+              <a:pPr algn="ctr"/>
+              <a:endParaRPr kumimoji="1" lang="ja-JP" altLang="en-US" dirty="0"/>
+            </a:p>
+          </p:txBody>
+        </p:sp>
         <p:pic>
           <p:nvPicPr>
-            <p:cNvPr id="9" name="図 8"/>
+            <p:cNvPr id="4" name="図 3"/>
             <p:cNvPicPr>
               <a:picLocks noChangeAspect="1"/>
             </p:cNvPicPr>
             <p:nvPr/>
           </p:nvPicPr>
           <p:blipFill>
-            <a:blip r:embed="rId8" cstate="print">
+            <a:blip r:embed="rId2">
               <a:extLst>
                 <a:ext uri="{28A0092B-C50C-407E-A947-70E740481C1C}">
                   <a14:useLocalDpi xmlns:a14="http://schemas.microsoft.com/office/drawing/2010/main" val="0"/>
@@ -3660,8 +3332,8 @@
           </p:blipFill>
           <p:spPr>
             <a:xfrm>
-              <a:off x="2849386" y="3146206"/>
-              <a:ext cx="1705368" cy="895704"/>
+              <a:off x="255311" y="778205"/>
+              <a:ext cx="2038117" cy="1159736"/>
             </a:xfrm>
             <a:prstGeom prst="rect">
               <a:avLst/>
@@ -3670,14 +3342,53 @@
         </p:pic>
         <p:pic>
           <p:nvPicPr>
-            <p:cNvPr id="30" name="図 29"/>
+            <p:cNvPr id="13" name="図 12"/>
             <p:cNvPicPr>
               <a:picLocks noChangeAspect="1"/>
             </p:cNvPicPr>
             <p:nvPr/>
           </p:nvPicPr>
           <p:blipFill>
-            <a:blip r:embed="rId9">
+            <a:blip r:embed="rId3">
+              <a:extLst>
+                <a:ext uri="{BEBA8EAE-BF5A-486C-A8C5-ECC9F3942E4B}">
+                  <a14:imgProps xmlns:a14="http://schemas.microsoft.com/office/drawing/2010/main">
+                    <a14:imgLayer r:embed="rId4">
+                      <a14:imgEffect>
+                        <a14:backgroundRemoval t="0" b="100000" l="0" r="99427"/>
+                      </a14:imgEffect>
+                    </a14:imgLayer>
+                  </a14:imgProps>
+                </a:ext>
+                <a:ext uri="{28A0092B-C50C-407E-A947-70E740481C1C}">
+                  <a14:useLocalDpi xmlns:a14="http://schemas.microsoft.com/office/drawing/2010/main" val="0"/>
+                </a:ext>
+              </a:extLst>
+            </a:blip>
+            <a:stretch>
+              <a:fillRect/>
+            </a:stretch>
+          </p:blipFill>
+          <p:spPr>
+            <a:xfrm>
+              <a:off x="9761261" y="520843"/>
+              <a:ext cx="1655487" cy="1674461"/>
+            </a:xfrm>
+            <a:prstGeom prst="rect">
+              <a:avLst/>
+            </a:prstGeom>
+          </p:spPr>
+        </p:pic>
+        <p:pic>
+          <p:nvPicPr>
+            <p:cNvPr id="15" name="図 14"/>
+            <p:cNvPicPr>
+              <a:picLocks noChangeAspect="1"/>
+            </p:cNvPicPr>
+            <p:nvPr/>
+          </p:nvPicPr>
+          <p:blipFill>
+            <a:blip r:embed="rId5" cstate="print">
               <a:extLst>
                 <a:ext uri="{28A0092B-C50C-407E-A947-70E740481C1C}">
                   <a14:useLocalDpi xmlns:a14="http://schemas.microsoft.com/office/drawing/2010/main" val="0"/>
@@ -3690,8 +3401,8 @@
           </p:blipFill>
           <p:spPr>
             <a:xfrm>
-              <a:off x="2964378" y="4217040"/>
-              <a:ext cx="1241042" cy="670163"/>
+              <a:off x="6298718" y="2892734"/>
+              <a:ext cx="1761090" cy="1144261"/>
             </a:xfrm>
             <a:prstGeom prst="rect">
               <a:avLst/>
@@ -3700,15 +3411,24 @@
         </p:pic>
         <p:pic>
           <p:nvPicPr>
-            <p:cNvPr id="31" name="図 30"/>
+            <p:cNvPr id="16" name="図 15"/>
             <p:cNvPicPr>
               <a:picLocks noChangeAspect="1"/>
             </p:cNvPicPr>
             <p:nvPr/>
           </p:nvPicPr>
           <p:blipFill>
-            <a:blip r:embed="rId10" cstate="print">
+            <a:blip r:embed="rId6">
               <a:extLst>
+                <a:ext uri="{BEBA8EAE-BF5A-486C-A8C5-ECC9F3942E4B}">
+                  <a14:imgProps xmlns:a14="http://schemas.microsoft.com/office/drawing/2010/main">
+                    <a14:imgLayer r:embed="rId7">
+                      <a14:imgEffect>
+                        <a14:backgroundRemoval t="6667" b="94000" l="3000" r="96000"/>
+                      </a14:imgEffect>
+                    </a14:imgLayer>
+                  </a14:imgProps>
+                </a:ext>
                 <a:ext uri="{28A0092B-C50C-407E-A947-70E740481C1C}">
                   <a14:useLocalDpi xmlns:a14="http://schemas.microsoft.com/office/drawing/2010/main" val="0"/>
                 </a:ext>
@@ -3720,83 +3440,387 @@
           </p:blipFill>
           <p:spPr>
             <a:xfrm>
-              <a:off x="3056040" y="4972295"/>
-              <a:ext cx="1110562" cy="775445"/>
+              <a:off x="5848873" y="5109670"/>
+              <a:ext cx="1276140" cy="1276140"/>
             </a:xfrm>
             <a:prstGeom prst="rect">
               <a:avLst/>
             </a:prstGeom>
           </p:spPr>
         </p:pic>
+        <p:cxnSp>
+          <p:nvCxnSpPr>
+            <p:cNvPr id="20" name="直線矢印コネクタ 19"/>
+            <p:cNvCxnSpPr/>
+            <p:nvPr/>
+          </p:nvCxnSpPr>
+          <p:spPr>
+            <a:xfrm>
+              <a:off x="5040490" y="5215062"/>
+              <a:ext cx="808383" cy="289909"/>
+            </a:xfrm>
+            <a:prstGeom prst="straightConnector1">
+              <a:avLst/>
+            </a:prstGeom>
+            <a:ln>
+              <a:headEnd type="triangle"/>
+              <a:tailEnd type="triangle"/>
+            </a:ln>
+          </p:spPr>
+          <p:style>
+            <a:lnRef idx="1">
+              <a:schemeClr val="accent1"/>
+            </a:lnRef>
+            <a:fillRef idx="0">
+              <a:schemeClr val="accent1"/>
+            </a:fillRef>
+            <a:effectRef idx="0">
+              <a:schemeClr val="accent1"/>
+            </a:effectRef>
+            <a:fontRef idx="minor">
+              <a:schemeClr val="tx1"/>
+            </a:fontRef>
+          </p:style>
+        </p:cxnSp>
+        <p:cxnSp>
+          <p:nvCxnSpPr>
+            <p:cNvPr id="26" name="直線矢印コネクタ 25"/>
+            <p:cNvCxnSpPr/>
+            <p:nvPr/>
+          </p:nvCxnSpPr>
+          <p:spPr>
+            <a:xfrm flipH="1">
+              <a:off x="8157748" y="2019438"/>
+              <a:ext cx="1603513" cy="979479"/>
+            </a:xfrm>
+            <a:prstGeom prst="straightConnector1">
+              <a:avLst/>
+            </a:prstGeom>
+            <a:ln>
+              <a:tailEnd type="triangle"/>
+            </a:ln>
+          </p:spPr>
+          <p:style>
+            <a:lnRef idx="1">
+              <a:schemeClr val="accent1"/>
+            </a:lnRef>
+            <a:fillRef idx="0">
+              <a:schemeClr val="accent1"/>
+            </a:fillRef>
+            <a:effectRef idx="0">
+              <a:schemeClr val="accent1"/>
+            </a:effectRef>
+            <a:fontRef idx="minor">
+              <a:schemeClr val="tx1"/>
+            </a:fontRef>
+          </p:style>
+        </p:cxnSp>
+        <p:sp>
+          <p:nvSpPr>
+            <p:cNvPr id="34" name="テキスト ボックス 33"/>
+            <p:cNvSpPr txBox="1"/>
+            <p:nvPr/>
+          </p:nvSpPr>
+          <p:spPr>
+            <a:xfrm>
+              <a:off x="5060707" y="1919486"/>
+              <a:ext cx="1645002" cy="369332"/>
+            </a:xfrm>
+            <a:prstGeom prst="rect">
+              <a:avLst/>
+            </a:prstGeom>
+            <a:noFill/>
+          </p:spPr>
+          <p:txBody>
+            <a:bodyPr wrap="none" rtlCol="0">
+              <a:spAutoFit/>
+            </a:bodyPr>
+            <a:lstStyle/>
+            <a:p>
+              <a:r>
+                <a:rPr kumimoji="1" lang="en-US" altLang="ja-JP" dirty="0" smtClean="0"/>
+                <a:t>Linux </a:t>
+              </a:r>
+              <a:r>
+                <a:rPr kumimoji="1" lang="en-US" altLang="ja-JP" dirty="0" smtClean="0"/>
+                <a:t>CentOS</a:t>
+              </a:r>
+              <a:endParaRPr kumimoji="1" lang="ja-JP" altLang="en-US" dirty="0"/>
+            </a:p>
+          </p:txBody>
+        </p:sp>
+        <p:sp>
+          <p:nvSpPr>
+            <p:cNvPr id="41" name="角丸四角形 40"/>
+            <p:cNvSpPr/>
+            <p:nvPr/>
+          </p:nvSpPr>
+          <p:spPr>
+            <a:xfrm>
+              <a:off x="2611464" y="2795446"/>
+              <a:ext cx="2186404" cy="3051283"/>
+            </a:xfrm>
+            <a:prstGeom prst="roundRect">
+              <a:avLst/>
+            </a:prstGeom>
+          </p:spPr>
+          <p:style>
+            <a:lnRef idx="2">
+              <a:schemeClr val="accent2"/>
+            </a:lnRef>
+            <a:fillRef idx="1">
+              <a:schemeClr val="lt1"/>
+            </a:fillRef>
+            <a:effectRef idx="0">
+              <a:schemeClr val="accent2"/>
+            </a:effectRef>
+            <a:fontRef idx="minor">
+              <a:schemeClr val="dk1"/>
+            </a:fontRef>
+          </p:style>
+          <p:txBody>
+            <a:bodyPr rtlCol="0" anchor="ctr"/>
+            <a:lstStyle/>
+            <a:p>
+              <a:pPr algn="ctr"/>
+              <a:endParaRPr kumimoji="1" lang="ja-JP" altLang="en-US"/>
+            </a:p>
+          </p:txBody>
+        </p:sp>
+        <p:sp>
+          <p:nvSpPr>
+            <p:cNvPr id="39" name="テキスト ボックス 38"/>
+            <p:cNvSpPr txBox="1"/>
+            <p:nvPr/>
+          </p:nvSpPr>
+          <p:spPr>
+            <a:xfrm>
+              <a:off x="636104" y="457200"/>
+              <a:ext cx="1063112" cy="369332"/>
+            </a:xfrm>
+            <a:prstGeom prst="rect">
+              <a:avLst/>
+            </a:prstGeom>
+            <a:noFill/>
+          </p:spPr>
+          <p:txBody>
+            <a:bodyPr wrap="none" rtlCol="0">
+              <a:spAutoFit/>
+            </a:bodyPr>
+            <a:lstStyle/>
+            <a:p>
+              <a:r>
+                <a:rPr lang="en-US" altLang="ja-JP" dirty="0" smtClean="0"/>
+                <a:t>Browser</a:t>
+              </a:r>
+              <a:endParaRPr kumimoji="1" lang="ja-JP" altLang="en-US" dirty="0"/>
+            </a:p>
+          </p:txBody>
+        </p:sp>
+        <p:sp>
+          <p:nvSpPr>
+            <p:cNvPr id="40" name="テキスト ボックス 39"/>
+            <p:cNvSpPr txBox="1"/>
+            <p:nvPr/>
+          </p:nvSpPr>
+          <p:spPr>
+            <a:xfrm>
+              <a:off x="9089540" y="2509177"/>
+              <a:ext cx="1394934" cy="369332"/>
+            </a:xfrm>
+            <a:prstGeom prst="rect">
+              <a:avLst/>
+            </a:prstGeom>
+            <a:noFill/>
+          </p:spPr>
+          <p:txBody>
+            <a:bodyPr wrap="none" rtlCol="0">
+              <a:spAutoFit/>
+            </a:bodyPr>
+            <a:lstStyle/>
+            <a:p>
+              <a:r>
+                <a:rPr lang="en-US" altLang="ja-JP" dirty="0" smtClean="0"/>
+                <a:t>Page Crawl</a:t>
+              </a:r>
+              <a:endParaRPr kumimoji="1" lang="ja-JP" altLang="en-US" dirty="0"/>
+            </a:p>
+          </p:txBody>
+        </p:sp>
+        <p:grpSp>
+          <p:nvGrpSpPr>
+            <p:cNvPr id="42" name="グループ化 41"/>
+            <p:cNvGrpSpPr/>
+            <p:nvPr/>
+          </p:nvGrpSpPr>
+          <p:grpSpPr>
+            <a:xfrm>
+              <a:off x="2849386" y="3146206"/>
+              <a:ext cx="1705368" cy="2601534"/>
+              <a:chOff x="2849386" y="3146206"/>
+              <a:chExt cx="1705368" cy="2601534"/>
+            </a:xfrm>
+          </p:grpSpPr>
+          <p:pic>
+            <p:nvPicPr>
+              <p:cNvPr id="9" name="図 8"/>
+              <p:cNvPicPr>
+                <a:picLocks noChangeAspect="1"/>
+              </p:cNvPicPr>
+              <p:nvPr/>
+            </p:nvPicPr>
+            <p:blipFill>
+              <a:blip r:embed="rId8" cstate="print">
+                <a:extLst>
+                  <a:ext uri="{28A0092B-C50C-407E-A947-70E740481C1C}">
+                    <a14:useLocalDpi xmlns:a14="http://schemas.microsoft.com/office/drawing/2010/main" val="0"/>
+                  </a:ext>
+                </a:extLst>
+              </a:blip>
+              <a:stretch>
+                <a:fillRect/>
+              </a:stretch>
+            </p:blipFill>
+            <p:spPr>
+              <a:xfrm>
+                <a:off x="2849386" y="3146206"/>
+                <a:ext cx="1705368" cy="895704"/>
+              </a:xfrm>
+              <a:prstGeom prst="rect">
+                <a:avLst/>
+              </a:prstGeom>
+            </p:spPr>
+          </p:pic>
+          <p:pic>
+            <p:nvPicPr>
+              <p:cNvPr id="30" name="図 29"/>
+              <p:cNvPicPr>
+                <a:picLocks noChangeAspect="1"/>
+              </p:cNvPicPr>
+              <p:nvPr/>
+            </p:nvPicPr>
+            <p:blipFill>
+              <a:blip r:embed="rId9">
+                <a:extLst>
+                  <a:ext uri="{28A0092B-C50C-407E-A947-70E740481C1C}">
+                    <a14:useLocalDpi xmlns:a14="http://schemas.microsoft.com/office/drawing/2010/main" val="0"/>
+                  </a:ext>
+                </a:extLst>
+              </a:blip>
+              <a:stretch>
+                <a:fillRect/>
+              </a:stretch>
+            </p:blipFill>
+            <p:spPr>
+              <a:xfrm>
+                <a:off x="2964378" y="4217040"/>
+                <a:ext cx="1241042" cy="670163"/>
+              </a:xfrm>
+              <a:prstGeom prst="rect">
+                <a:avLst/>
+              </a:prstGeom>
+            </p:spPr>
+          </p:pic>
+          <p:pic>
+            <p:nvPicPr>
+              <p:cNvPr id="31" name="図 30"/>
+              <p:cNvPicPr>
+                <a:picLocks noChangeAspect="1"/>
+              </p:cNvPicPr>
+              <p:nvPr/>
+            </p:nvPicPr>
+            <p:blipFill>
+              <a:blip r:embed="rId10" cstate="print">
+                <a:extLst>
+                  <a:ext uri="{28A0092B-C50C-407E-A947-70E740481C1C}">
+                    <a14:useLocalDpi xmlns:a14="http://schemas.microsoft.com/office/drawing/2010/main" val="0"/>
+                  </a:ext>
+                </a:extLst>
+              </a:blip>
+              <a:stretch>
+                <a:fillRect/>
+              </a:stretch>
+            </p:blipFill>
+            <p:spPr>
+              <a:xfrm>
+                <a:off x="3056040" y="4972295"/>
+                <a:ext cx="1110562" cy="775445"/>
+              </a:xfrm>
+              <a:prstGeom prst="rect">
+                <a:avLst/>
+              </a:prstGeom>
+            </p:spPr>
+          </p:pic>
+        </p:grpSp>
+        <p:cxnSp>
+          <p:nvCxnSpPr>
+            <p:cNvPr id="36" name="直線矢印コネクタ 35"/>
+            <p:cNvCxnSpPr/>
+            <p:nvPr/>
+          </p:nvCxnSpPr>
+          <p:spPr>
+            <a:xfrm>
+              <a:off x="1560459" y="2301002"/>
+              <a:ext cx="1368552" cy="1045271"/>
+            </a:xfrm>
+            <a:prstGeom prst="straightConnector1">
+              <a:avLst/>
+            </a:prstGeom>
+            <a:ln>
+              <a:headEnd type="triangle"/>
+              <a:tailEnd type="triangle"/>
+            </a:ln>
+          </p:spPr>
+          <p:style>
+            <a:lnRef idx="1">
+              <a:schemeClr val="accent1"/>
+            </a:lnRef>
+            <a:fillRef idx="0">
+              <a:schemeClr val="accent1"/>
+            </a:fillRef>
+            <a:effectRef idx="0">
+              <a:schemeClr val="accent1"/>
+            </a:effectRef>
+            <a:fontRef idx="minor">
+              <a:schemeClr val="tx1"/>
+            </a:fontRef>
+          </p:style>
+        </p:cxnSp>
+        <p:cxnSp>
+          <p:nvCxnSpPr>
+            <p:cNvPr id="22" name="直線矢印コネクタ 21"/>
+            <p:cNvCxnSpPr/>
+            <p:nvPr/>
+          </p:nvCxnSpPr>
+          <p:spPr>
+            <a:xfrm flipV="1">
+              <a:off x="5035790" y="3752902"/>
+              <a:ext cx="1208678" cy="637255"/>
+            </a:xfrm>
+            <a:prstGeom prst="straightConnector1">
+              <a:avLst/>
+            </a:prstGeom>
+            <a:ln>
+              <a:headEnd type="triangle"/>
+              <a:tailEnd type="triangle"/>
+            </a:ln>
+          </p:spPr>
+          <p:style>
+            <a:lnRef idx="1">
+              <a:schemeClr val="accent1"/>
+            </a:lnRef>
+            <a:fillRef idx="0">
+              <a:schemeClr val="accent1"/>
+            </a:fillRef>
+            <a:effectRef idx="0">
+              <a:schemeClr val="accent1"/>
+            </a:effectRef>
+            <a:fontRef idx="minor">
+              <a:schemeClr val="tx1"/>
+            </a:fontRef>
+          </p:style>
+        </p:cxnSp>
       </p:grpSp>
-      <p:cxnSp>
-        <p:nvCxnSpPr>
-          <p:cNvPr id="36" name="直線矢印コネクタ 35"/>
-          <p:cNvCxnSpPr/>
-          <p:nvPr/>
-        </p:nvCxnSpPr>
-        <p:spPr>
-          <a:xfrm>
-            <a:off x="1560459" y="2301002"/>
-            <a:ext cx="1368552" cy="1045271"/>
-          </a:xfrm>
-          <a:prstGeom prst="straightConnector1">
-            <a:avLst/>
-          </a:prstGeom>
-          <a:ln>
-            <a:headEnd type="triangle"/>
-            <a:tailEnd type="triangle"/>
-          </a:ln>
-        </p:spPr>
-        <p:style>
-          <a:lnRef idx="1">
-            <a:schemeClr val="accent1"/>
-          </a:lnRef>
-          <a:fillRef idx="0">
-            <a:schemeClr val="accent1"/>
-          </a:fillRef>
-          <a:effectRef idx="0">
-            <a:schemeClr val="accent1"/>
-          </a:effectRef>
-          <a:fontRef idx="minor">
-            <a:schemeClr val="tx1"/>
-          </a:fontRef>
-        </p:style>
-      </p:cxnSp>
-      <p:cxnSp>
-        <p:nvCxnSpPr>
-          <p:cNvPr id="22" name="直線矢印コネクタ 21"/>
-          <p:cNvCxnSpPr/>
-          <p:nvPr/>
-        </p:nvCxnSpPr>
-        <p:spPr>
-          <a:xfrm flipV="1">
-            <a:off x="5035790" y="3752902"/>
-            <a:ext cx="1208678" cy="637255"/>
-          </a:xfrm>
-          <a:prstGeom prst="straightConnector1">
-            <a:avLst/>
-          </a:prstGeom>
-          <a:ln>
-            <a:headEnd type="triangle"/>
-            <a:tailEnd type="triangle"/>
-          </a:ln>
-        </p:spPr>
-        <p:style>
-          <a:lnRef idx="1">
-            <a:schemeClr val="accent1"/>
-          </a:lnRef>
-          <a:fillRef idx="0">
-            <a:schemeClr val="accent1"/>
-          </a:fillRef>
-          <a:effectRef idx="0">
-            <a:schemeClr val="accent1"/>
-          </a:effectRef>
-          <a:fontRef idx="minor">
-            <a:schemeClr val="tx1"/>
-          </a:fontRef>
-        </p:style>
-      </p:cxnSp>
     </p:spTree>
     <p:extLst>
       <p:ext uri="{BB962C8B-B14F-4D97-AF65-F5344CB8AC3E}">

</xml_diff>